<commit_message>
presentation slide minor changes
</commit_message>
<xml_diff>
--- a/Presentation/KinMel.pptx
+++ b/Presentation/KinMel.pptx
@@ -25,15 +25,15 @@
   <p:notesSz cx="6858000" cy="9144000"/>
   <p:embeddedFontLst>
     <p:embeddedFont>
-      <p:font typeface="Calibri" panose="020F0502020204030204" pitchFamily="34" charset="0"/>
+      <p:font typeface="Bebas Neue Bold" panose="020B0604020202020204" charset="0"/>
       <p:regular r:id="rId15"/>
-      <p:bold r:id="rId16"/>
-      <p:italic r:id="rId17"/>
-      <p:boldItalic r:id="rId18"/>
     </p:embeddedFont>
     <p:embeddedFont>
-      <p:font typeface="Bebas Neue Bold" panose="020B0604020202020204" charset="0"/>
-      <p:regular r:id="rId19"/>
+      <p:font typeface="Calibri" panose="020F0502020204030204" pitchFamily="34" charset="0"/>
+      <p:regular r:id="rId16"/>
+      <p:bold r:id="rId17"/>
+      <p:italic r:id="rId18"/>
+      <p:boldItalic r:id="rId19"/>
     </p:embeddedFont>
   </p:embeddedFontLst>
   <p:defaultTextStyle>
@@ -133,7 +133,7 @@
   </p:defaultTextStyle>
   <p:extLst>
     <p:ext uri="{EFAFB233-063F-42B5-8137-9DF3F51BA10A}">
-      <p15:sldGuideLst xmlns:p15="http://schemas.microsoft.com/office/powerpoint/2012/main">
+      <p15:sldGuideLst xmlns:p15="http://schemas.microsoft.com/office/powerpoint/2012/main" xmlns="">
         <p15:guide id="1" orient="horz" pos="2160">
           <p15:clr>
             <a:srgbClr val="A4A3A4"/>
@@ -232,7 +232,7 @@
           <a:p>
             <a:fld id="{D955000C-F1CE-45C1-AE85-0E7F3397B81C}" type="datetimeFigureOut">
               <a:rPr lang="en-US" smtClean="0"/>
-              <a:t>4/29/2024</a:t>
+              <a:t>4/30/2024</a:t>
             </a:fld>
             <a:endParaRPr lang="en-US"/>
           </a:p>
@@ -766,7 +766,7 @@
             <a:fld id="{1D8BD707-D9CF-40AE-B4C6-C98DA3205C09}" type="datetimeFigureOut">
               <a:rPr lang="en-US" smtClean="0"/>
               <a:pPr/>
-              <a:t>4/29/2024</a:t>
+              <a:t>4/30/2024</a:t>
             </a:fld>
             <a:endParaRPr lang="en-US"/>
           </a:p>
@@ -933,7 +933,7 @@
             <a:fld id="{1D8BD707-D9CF-40AE-B4C6-C98DA3205C09}" type="datetimeFigureOut">
               <a:rPr lang="en-US" smtClean="0"/>
               <a:pPr/>
-              <a:t>4/29/2024</a:t>
+              <a:t>4/30/2024</a:t>
             </a:fld>
             <a:endParaRPr lang="en-US"/>
           </a:p>
@@ -1110,7 +1110,7 @@
             <a:fld id="{1D8BD707-D9CF-40AE-B4C6-C98DA3205C09}" type="datetimeFigureOut">
               <a:rPr lang="en-US" smtClean="0"/>
               <a:pPr/>
-              <a:t>4/29/2024</a:t>
+              <a:t>4/30/2024</a:t>
             </a:fld>
             <a:endParaRPr lang="en-US"/>
           </a:p>
@@ -1277,7 +1277,7 @@
             <a:fld id="{1D8BD707-D9CF-40AE-B4C6-C98DA3205C09}" type="datetimeFigureOut">
               <a:rPr lang="en-US" smtClean="0"/>
               <a:pPr/>
-              <a:t>4/29/2024</a:t>
+              <a:t>4/30/2024</a:t>
             </a:fld>
             <a:endParaRPr lang="en-US"/>
           </a:p>
@@ -1520,7 +1520,7 @@
             <a:fld id="{1D8BD707-D9CF-40AE-B4C6-C98DA3205C09}" type="datetimeFigureOut">
               <a:rPr lang="en-US" smtClean="0"/>
               <a:pPr/>
-              <a:t>4/29/2024</a:t>
+              <a:t>4/30/2024</a:t>
             </a:fld>
             <a:endParaRPr lang="en-US"/>
           </a:p>
@@ -1805,7 +1805,7 @@
             <a:fld id="{1D8BD707-D9CF-40AE-B4C6-C98DA3205C09}" type="datetimeFigureOut">
               <a:rPr lang="en-US" smtClean="0"/>
               <a:pPr/>
-              <a:t>4/29/2024</a:t>
+              <a:t>4/30/2024</a:t>
             </a:fld>
             <a:endParaRPr lang="en-US"/>
           </a:p>
@@ -2224,7 +2224,7 @@
             <a:fld id="{1D8BD707-D9CF-40AE-B4C6-C98DA3205C09}" type="datetimeFigureOut">
               <a:rPr lang="en-US" smtClean="0"/>
               <a:pPr/>
-              <a:t>4/29/2024</a:t>
+              <a:t>4/30/2024</a:t>
             </a:fld>
             <a:endParaRPr lang="en-US"/>
           </a:p>
@@ -2339,7 +2339,7 @@
             <a:fld id="{1D8BD707-D9CF-40AE-B4C6-C98DA3205C09}" type="datetimeFigureOut">
               <a:rPr lang="en-US" smtClean="0"/>
               <a:pPr/>
-              <a:t>4/29/2024</a:t>
+              <a:t>4/30/2024</a:t>
             </a:fld>
             <a:endParaRPr lang="en-US"/>
           </a:p>
@@ -2431,7 +2431,7 @@
             <a:fld id="{1D8BD707-D9CF-40AE-B4C6-C98DA3205C09}" type="datetimeFigureOut">
               <a:rPr lang="en-US" smtClean="0"/>
               <a:pPr/>
-              <a:t>4/29/2024</a:t>
+              <a:t>4/30/2024</a:t>
             </a:fld>
             <a:endParaRPr lang="en-US"/>
           </a:p>
@@ -2705,7 +2705,7 @@
             <a:fld id="{1D8BD707-D9CF-40AE-B4C6-C98DA3205C09}" type="datetimeFigureOut">
               <a:rPr lang="en-US" smtClean="0"/>
               <a:pPr/>
-              <a:t>4/29/2024</a:t>
+              <a:t>4/30/2024</a:t>
             </a:fld>
             <a:endParaRPr lang="en-US"/>
           </a:p>
@@ -2955,7 +2955,7 @@
             <a:fld id="{1D8BD707-D9CF-40AE-B4C6-C98DA3205C09}" type="datetimeFigureOut">
               <a:rPr lang="en-US" smtClean="0"/>
               <a:pPr/>
-              <a:t>4/29/2024</a:t>
+              <a:t>4/30/2024</a:t>
             </a:fld>
             <a:endParaRPr lang="en-US"/>
           </a:p>
@@ -3165,7 +3165,7 @@
             <a:fld id="{1D8BD707-D9CF-40AE-B4C6-C98DA3205C09}" type="datetimeFigureOut">
               <a:rPr lang="en-US" smtClean="0"/>
               <a:pPr/>
-              <a:t>4/29/2024</a:t>
+              <a:t>4/30/2024</a:t>
             </a:fld>
             <a:endParaRPr lang="en-US"/>
           </a:p>
@@ -3725,7 +3725,7 @@
             <a:blip r:embed="rId3">
               <a:extLst>
                 <a:ext uri="{96DAC541-7B7A-43D3-8B79-37D633B846F1}">
-                  <asvg:svgBlip xmlns="" xmlns:asvg="http://schemas.microsoft.com/office/drawing/2016/SVG/main" r:embed="rId4"/>
+                  <asvg:svgBlip xmlns:asvg="http://schemas.microsoft.com/office/drawing/2016/SVG/main" xmlns="" r:embed="rId4"/>
                 </a:ext>
               </a:extLst>
             </a:blip>
@@ -3777,7 +3777,7 @@
             <a:blip r:embed="rId3">
               <a:extLst>
                 <a:ext uri="{96DAC541-7B7A-43D3-8B79-37D633B846F1}">
-                  <asvg:svgBlip xmlns="" xmlns:asvg="http://schemas.microsoft.com/office/drawing/2016/SVG/main" r:embed="rId4"/>
+                  <asvg:svgBlip xmlns:asvg="http://schemas.microsoft.com/office/drawing/2016/SVG/main" xmlns="" r:embed="rId4"/>
                 </a:ext>
               </a:extLst>
             </a:blip>
@@ -3862,6 +3862,105 @@
               </a:rPr>
               <a:t>"Bringing Nepal's Charm to Your Palm: Shop, Smile, and Save with Us!"</a:t>
             </a:r>
+          </a:p>
+        </p:txBody>
+      </p:sp>
+      <p:sp>
+        <p:nvSpPr>
+          <p:cNvPr id="8" name="TextBox 7"/>
+          <p:cNvSpPr txBox="1"/>
+          <p:nvPr/>
+        </p:nvSpPr>
+        <p:spPr>
+          <a:xfrm>
+            <a:off x="724328" y="8717340"/>
+            <a:ext cx="4191000" cy="1569660"/>
+          </a:xfrm>
+          <a:prstGeom prst="rect">
+            <a:avLst/>
+          </a:prstGeom>
+          <a:noFill/>
+        </p:spPr>
+        <p:txBody>
+          <a:bodyPr wrap="square" rtlCol="0">
+            <a:spAutoFit/>
+          </a:bodyPr>
+          <a:lstStyle/>
+          <a:p>
+            <a:r>
+              <a:rPr lang="en-US" sz="2400" dirty="0" smtClean="0">
+                <a:latin typeface="Times New Roman" panose="02020603050405020304" pitchFamily="18" charset="0"/>
+                <a:cs typeface="Times New Roman" panose="02020603050405020304" pitchFamily="18" charset="0"/>
+              </a:rPr>
+              <a:t>Presented By:</a:t>
+            </a:r>
+          </a:p>
+          <a:p>
+            <a:r>
+              <a:rPr lang="en-US" sz="2400" dirty="0" smtClean="0">
+                <a:latin typeface="Times New Roman" panose="02020603050405020304" pitchFamily="18" charset="0"/>
+                <a:cs typeface="Times New Roman" panose="02020603050405020304" pitchFamily="18" charset="0"/>
+              </a:rPr>
+              <a:t>Suman </a:t>
+            </a:r>
+            <a:r>
+              <a:rPr lang="en-US" sz="2400" dirty="0" err="1" smtClean="0">
+                <a:latin typeface="Times New Roman" panose="02020603050405020304" pitchFamily="18" charset="0"/>
+                <a:cs typeface="Times New Roman" panose="02020603050405020304" pitchFamily="18" charset="0"/>
+              </a:rPr>
+              <a:t>Devkota</a:t>
+            </a:r>
+            <a:endParaRPr lang="en-US" sz="2400" dirty="0" smtClean="0">
+              <a:latin typeface="Times New Roman" panose="02020603050405020304" pitchFamily="18" charset="0"/>
+              <a:cs typeface="Times New Roman" panose="02020603050405020304" pitchFamily="18" charset="0"/>
+            </a:endParaRPr>
+          </a:p>
+          <a:p>
+            <a:r>
+              <a:rPr lang="en-US" sz="2400" dirty="0" smtClean="0">
+                <a:latin typeface="Times New Roman" panose="02020603050405020304" pitchFamily="18" charset="0"/>
+                <a:cs typeface="Times New Roman" panose="02020603050405020304" pitchFamily="18" charset="0"/>
+              </a:rPr>
+              <a:t>Arpan </a:t>
+            </a:r>
+            <a:r>
+              <a:rPr lang="en-US" sz="2400" dirty="0" err="1" smtClean="0">
+                <a:latin typeface="Times New Roman" panose="02020603050405020304" pitchFamily="18" charset="0"/>
+                <a:cs typeface="Times New Roman" panose="02020603050405020304" pitchFamily="18" charset="0"/>
+              </a:rPr>
+              <a:t>Pokhrel</a:t>
+            </a:r>
+            <a:endParaRPr lang="en-US" sz="2400" dirty="0" smtClean="0">
+              <a:latin typeface="Times New Roman" panose="02020603050405020304" pitchFamily="18" charset="0"/>
+              <a:cs typeface="Times New Roman" panose="02020603050405020304" pitchFamily="18" charset="0"/>
+            </a:endParaRPr>
+          </a:p>
+          <a:p>
+            <a:r>
+              <a:rPr lang="en-US" sz="2400" dirty="0" err="1" smtClean="0">
+                <a:latin typeface="Times New Roman" panose="02020603050405020304" pitchFamily="18" charset="0"/>
+                <a:cs typeface="Times New Roman" panose="02020603050405020304" pitchFamily="18" charset="0"/>
+              </a:rPr>
+              <a:t>Navina</a:t>
+            </a:r>
+            <a:r>
+              <a:rPr lang="en-US" sz="2400" dirty="0" smtClean="0">
+                <a:latin typeface="Times New Roman" panose="02020603050405020304" pitchFamily="18" charset="0"/>
+                <a:cs typeface="Times New Roman" panose="02020603050405020304" pitchFamily="18" charset="0"/>
+              </a:rPr>
+              <a:t> </a:t>
+            </a:r>
+            <a:r>
+              <a:rPr lang="en-US" sz="2400" dirty="0" err="1" smtClean="0">
+                <a:latin typeface="Times New Roman" panose="02020603050405020304" pitchFamily="18" charset="0"/>
+                <a:cs typeface="Times New Roman" panose="02020603050405020304" pitchFamily="18" charset="0"/>
+              </a:rPr>
+              <a:t>Budhathoki</a:t>
+            </a:r>
+            <a:endParaRPr lang="en-US" sz="2400" dirty="0">
+              <a:latin typeface="Times New Roman" panose="02020603050405020304" pitchFamily="18" charset="0"/>
+              <a:cs typeface="Times New Roman" panose="02020603050405020304" pitchFamily="18" charset="0"/>
+            </a:endParaRPr>
           </a:p>
         </p:txBody>
       </p:sp>
@@ -4032,7 +4131,7 @@
             <a:blip r:embed="rId2">
               <a:extLst>
                 <a:ext uri="{96DAC541-7B7A-43D3-8B79-37D633B846F1}">
-                  <asvg:svgBlip xmlns="" xmlns:asvg="http://schemas.microsoft.com/office/drawing/2016/SVG/main" r:embed="rId4"/>
+                  <asvg:svgBlip xmlns:asvg="http://schemas.microsoft.com/office/drawing/2016/SVG/main" xmlns="" r:embed="rId4"/>
                 </a:ext>
               </a:extLst>
             </a:blip>
@@ -4084,7 +4183,7 @@
             <a:blip r:embed="rId5">
               <a:extLst>
                 <a:ext uri="{96DAC541-7B7A-43D3-8B79-37D633B846F1}">
-                  <asvg:svgBlip xmlns="" xmlns:asvg="http://schemas.microsoft.com/office/drawing/2016/SVG/main" r:embed="rId6"/>
+                  <asvg:svgBlip xmlns:asvg="http://schemas.microsoft.com/office/drawing/2016/SVG/main" xmlns="" r:embed="rId6"/>
                 </a:ext>
               </a:extLst>
             </a:blip>
@@ -4459,7 +4558,7 @@
             <a:blip r:embed="rId2">
               <a:extLst>
                 <a:ext uri="{96DAC541-7B7A-43D3-8B79-37D633B846F1}">
-                  <asvg:svgBlip xmlns="" xmlns:asvg="http://schemas.microsoft.com/office/drawing/2016/SVG/main" r:embed="rId4"/>
+                  <asvg:svgBlip xmlns:asvg="http://schemas.microsoft.com/office/drawing/2016/SVG/main" xmlns="" r:embed="rId4"/>
                 </a:ext>
               </a:extLst>
             </a:blip>
@@ -4511,7 +4610,7 @@
             <a:blip r:embed="rId2">
               <a:extLst>
                 <a:ext uri="{96DAC541-7B7A-43D3-8B79-37D633B846F1}">
-                  <asvg:svgBlip xmlns="" xmlns:asvg="http://schemas.microsoft.com/office/drawing/2016/SVG/main" r:embed="rId4"/>
+                  <asvg:svgBlip xmlns:asvg="http://schemas.microsoft.com/office/drawing/2016/SVG/main" xmlns="" r:embed="rId4"/>
                 </a:ext>
               </a:extLst>
             </a:blip>
@@ -5232,7 +5331,7 @@
             <a:blip r:embed="rId3">
               <a:extLst>
                 <a:ext uri="{96DAC541-7B7A-43D3-8B79-37D633B846F1}">
-                  <asvg:svgBlip xmlns="" xmlns:asvg="http://schemas.microsoft.com/office/drawing/2016/SVG/main" r:embed="rId12"/>
+                  <asvg:svgBlip xmlns:asvg="http://schemas.microsoft.com/office/drawing/2016/SVG/main" xmlns="" r:embed="rId12"/>
                 </a:ext>
               </a:extLst>
             </a:blip>
@@ -5284,7 +5383,7 @@
             <a:blip r:embed="rId3">
               <a:extLst>
                 <a:ext uri="{96DAC541-7B7A-43D3-8B79-37D633B846F1}">
-                  <asvg:svgBlip xmlns="" xmlns:asvg="http://schemas.microsoft.com/office/drawing/2016/SVG/main" r:embed="rId12"/>
+                  <asvg:svgBlip xmlns:asvg="http://schemas.microsoft.com/office/drawing/2016/SVG/main" xmlns="" r:embed="rId12"/>
                 </a:ext>
               </a:extLst>
             </a:blip>
@@ -5296,57 +5395,13 @@
       </p:sp>
       <p:sp>
         <p:nvSpPr>
-          <p:cNvPr id="24" name="TextBox 24"/>
-          <p:cNvSpPr txBox="1"/>
-          <p:nvPr/>
-        </p:nvSpPr>
-        <p:spPr>
-          <a:xfrm>
-            <a:off x="904440" y="1125681"/>
-            <a:ext cx="6860278" cy="1013098"/>
-          </a:xfrm>
-          <a:prstGeom prst="rect">
-            <a:avLst/>
-          </a:prstGeom>
-        </p:spPr>
-        <p:txBody>
-          <a:bodyPr lIns="0" tIns="0" rIns="0" bIns="0" rtlCol="0" anchor="t">
-            <a:spAutoFit/>
-          </a:bodyPr>
-          <a:lstStyle/>
-          <a:p>
-            <a:pPr>
-              <a:lnSpc>
-                <a:spcPts val="7874"/>
-              </a:lnSpc>
-            </a:pPr>
-            <a:r>
-              <a:rPr lang="en-US" sz="7499" dirty="0" smtClean="0">
-                <a:solidFill>
-                  <a:srgbClr val="FFFFFF"/>
-                </a:solidFill>
-                <a:latin typeface="Bebas Neue Bold"/>
-              </a:rPr>
-              <a:t>CONCLUSION</a:t>
-            </a:r>
-            <a:endParaRPr lang="en-US" sz="7499" dirty="0">
-              <a:solidFill>
-                <a:srgbClr val="FFFFFF"/>
-              </a:solidFill>
-              <a:latin typeface="Bebas Neue Bold"/>
-            </a:endParaRPr>
-          </a:p>
-        </p:txBody>
-      </p:sp>
-      <p:sp>
-        <p:nvSpPr>
           <p:cNvPr id="28" name="TextBox 27"/>
           <p:cNvSpPr txBox="1"/>
           <p:nvPr/>
         </p:nvSpPr>
         <p:spPr>
           <a:xfrm>
-            <a:off x="582272" y="6449873"/>
+            <a:off x="381000" y="2933700"/>
             <a:ext cx="8239560" cy="3785652"/>
           </a:xfrm>
           <a:prstGeom prst="rect">
@@ -5434,41 +5489,6 @@
           </a:prstGeom>
         </p:spPr>
       </p:pic>
-      <p:sp>
-        <p:nvSpPr>
-          <p:cNvPr id="30" name="TextBox 29"/>
-          <p:cNvSpPr txBox="1"/>
-          <p:nvPr/>
-        </p:nvSpPr>
-        <p:spPr>
-          <a:xfrm>
-            <a:off x="380999" y="3543300"/>
-            <a:ext cx="7460251" cy="2308324"/>
-          </a:xfrm>
-          <a:prstGeom prst="rect">
-            <a:avLst/>
-          </a:prstGeom>
-          <a:noFill/>
-        </p:spPr>
-        <p:txBody>
-          <a:bodyPr wrap="square" rtlCol="0">
-            <a:spAutoFit/>
-          </a:bodyPr>
-          <a:lstStyle/>
-          <a:p>
-            <a:r>
-              <a:rPr lang="en-US" sz="3600" dirty="0" smtClean="0">
-                <a:solidFill>
-                  <a:schemeClr val="bg1"/>
-                </a:solidFill>
-                <a:latin typeface="Times New Roman" panose="02020603050405020304" pitchFamily="18" charset="0"/>
-                <a:cs typeface="Times New Roman" panose="02020603050405020304" pitchFamily="18" charset="0"/>
-              </a:rPr>
-              <a:t>KinMel will make sure that everyone have their customized experience they deserve by offering different apps for buyers and sellers.</a:t>
-            </a:r>
-          </a:p>
-        </p:txBody>
-      </p:sp>
     </p:spTree>
   </p:cSld>
   <p:clrMapOvr>
@@ -5806,7 +5826,7 @@
             <a:blip r:embed="rId2">
               <a:extLst>
                 <a:ext uri="{96DAC541-7B7A-43D3-8B79-37D633B846F1}">
-                  <asvg:svgBlip xmlns="" xmlns:asvg="http://schemas.microsoft.com/office/drawing/2016/SVG/main" r:embed="rId4"/>
+                  <asvg:svgBlip xmlns:asvg="http://schemas.microsoft.com/office/drawing/2016/SVG/main" xmlns="" r:embed="rId4"/>
                 </a:ext>
               </a:extLst>
             </a:blip>
@@ -5858,7 +5878,7 @@
             <a:blip r:embed="rId5">
               <a:extLst>
                 <a:ext uri="{96DAC541-7B7A-43D3-8B79-37D633B846F1}">
-                  <asvg:svgBlip xmlns="" xmlns:asvg="http://schemas.microsoft.com/office/drawing/2016/SVG/main" r:embed="rId6"/>
+                  <asvg:svgBlip xmlns:asvg="http://schemas.microsoft.com/office/drawing/2016/SVG/main" xmlns="" r:embed="rId6"/>
                 </a:ext>
               </a:extLst>
             </a:blip>
@@ -6517,7 +6537,7 @@
             <a:blip r:embed="rId2">
               <a:extLst>
                 <a:ext uri="{96DAC541-7B7A-43D3-8B79-37D633B846F1}">
-                  <asvg:svgBlip xmlns="" xmlns:asvg="http://schemas.microsoft.com/office/drawing/2016/SVG/main" r:embed="rId4"/>
+                  <asvg:svgBlip xmlns:asvg="http://schemas.microsoft.com/office/drawing/2016/SVG/main" xmlns="" r:embed="rId4"/>
                 </a:ext>
               </a:extLst>
             </a:blip>
@@ -6569,7 +6589,7 @@
             <a:blip r:embed="rId5">
               <a:extLst>
                 <a:ext uri="{96DAC541-7B7A-43D3-8B79-37D633B846F1}">
-                  <asvg:svgBlip xmlns="" xmlns:asvg="http://schemas.microsoft.com/office/drawing/2016/SVG/main" r:embed="rId6"/>
+                  <asvg:svgBlip xmlns:asvg="http://schemas.microsoft.com/office/drawing/2016/SVG/main" xmlns="" r:embed="rId6"/>
                 </a:ext>
               </a:extLst>
             </a:blip>
@@ -7060,7 +7080,7 @@
             <a:blip r:embed="rId2">
               <a:extLst>
                 <a:ext uri="{96DAC541-7B7A-43D3-8B79-37D633B846F1}">
-                  <asvg:svgBlip xmlns="" xmlns:asvg="http://schemas.microsoft.com/office/drawing/2016/SVG/main" r:embed="rId4"/>
+                  <asvg:svgBlip xmlns:asvg="http://schemas.microsoft.com/office/drawing/2016/SVG/main" xmlns="" r:embed="rId4"/>
                 </a:ext>
               </a:extLst>
             </a:blip>
@@ -7112,7 +7132,7 @@
             <a:blip r:embed="rId5">
               <a:extLst>
                 <a:ext uri="{96DAC541-7B7A-43D3-8B79-37D633B846F1}">
-                  <asvg:svgBlip xmlns="" xmlns:asvg="http://schemas.microsoft.com/office/drawing/2016/SVG/main" r:embed="rId6"/>
+                  <asvg:svgBlip xmlns:asvg="http://schemas.microsoft.com/office/drawing/2016/SVG/main" xmlns="" r:embed="rId6"/>
                 </a:ext>
               </a:extLst>
             </a:blip>
@@ -7433,7 +7453,7 @@
             <a:blip r:embed="rId2">
               <a:extLst>
                 <a:ext uri="{96DAC541-7B7A-43D3-8B79-37D633B846F1}">
-                  <asvg:svgBlip xmlns="" xmlns:asvg="http://schemas.microsoft.com/office/drawing/2016/SVG/main" r:embed="rId4"/>
+                  <asvg:svgBlip xmlns:asvg="http://schemas.microsoft.com/office/drawing/2016/SVG/main" xmlns="" r:embed="rId4"/>
                 </a:ext>
               </a:extLst>
             </a:blip>
@@ -7485,7 +7505,7 @@
             <a:blip r:embed="rId5">
               <a:extLst>
                 <a:ext uri="{96DAC541-7B7A-43D3-8B79-37D633B846F1}">
-                  <asvg:svgBlip xmlns="" xmlns:asvg="http://schemas.microsoft.com/office/drawing/2016/SVG/main" r:embed="rId6"/>
+                  <asvg:svgBlip xmlns:asvg="http://schemas.microsoft.com/office/drawing/2016/SVG/main" xmlns="" r:embed="rId6"/>
                 </a:ext>
               </a:extLst>
             </a:blip>
@@ -7858,7 +7878,7 @@
             <a:blip r:embed="rId2">
               <a:extLst>
                 <a:ext uri="{96DAC541-7B7A-43D3-8B79-37D633B846F1}">
-                  <asvg:svgBlip xmlns="" xmlns:asvg="http://schemas.microsoft.com/office/drawing/2016/SVG/main" r:embed="rId4"/>
+                  <asvg:svgBlip xmlns:asvg="http://schemas.microsoft.com/office/drawing/2016/SVG/main" xmlns="" r:embed="rId4"/>
                 </a:ext>
               </a:extLst>
             </a:blip>
@@ -7910,7 +7930,7 @@
             <a:blip r:embed="rId2">
               <a:extLst>
                 <a:ext uri="{96DAC541-7B7A-43D3-8B79-37D633B846F1}">
-                  <asvg:svgBlip xmlns="" xmlns:asvg="http://schemas.microsoft.com/office/drawing/2016/SVG/main" r:embed="rId4"/>
+                  <asvg:svgBlip xmlns:asvg="http://schemas.microsoft.com/office/drawing/2016/SVG/main" xmlns="" r:embed="rId4"/>
                 </a:ext>
               </a:extLst>
             </a:blip>
@@ -8323,7 +8343,7 @@
             <a:blip r:embed="rId2">
               <a:extLst>
                 <a:ext uri="{96DAC541-7B7A-43D3-8B79-37D633B846F1}">
-                  <asvg:svgBlip xmlns="" xmlns:asvg="http://schemas.microsoft.com/office/drawing/2016/SVG/main" r:embed="rId4"/>
+                  <asvg:svgBlip xmlns:asvg="http://schemas.microsoft.com/office/drawing/2016/SVG/main" xmlns="" r:embed="rId4"/>
                 </a:ext>
               </a:extLst>
             </a:blip>
@@ -8375,7 +8395,7 @@
             <a:blip r:embed="rId2">
               <a:extLst>
                 <a:ext uri="{96DAC541-7B7A-43D3-8B79-37D633B846F1}">
-                  <asvg:svgBlip xmlns="" xmlns:asvg="http://schemas.microsoft.com/office/drawing/2016/SVG/main" r:embed="rId4"/>
+                  <asvg:svgBlip xmlns:asvg="http://schemas.microsoft.com/office/drawing/2016/SVG/main" xmlns="" r:embed="rId4"/>
                 </a:ext>
               </a:extLst>
             </a:blip>
@@ -8536,7 +8556,17 @@
                 <a:latin typeface="Times New Roman" panose="02020603050405020304" pitchFamily="18" charset="0"/>
                 <a:cs typeface="Times New Roman" panose="02020603050405020304" pitchFamily="18" charset="0"/>
               </a:rPr>
-              <a:t>To enable sellers to request new categories, facilitating dynamic category to meet market demands and enhance product visibility.</a:t>
+              <a:t>To enable sellers to request new categories, facilitating dynamic category to meet market demands and enhance product visibility</a:t>
+            </a:r>
+            <a:r>
+              <a:rPr lang="en-GB" sz="4800" dirty="0" smtClean="0">
+                <a:solidFill>
+                  <a:schemeClr val="bg1"/>
+                </a:solidFill>
+                <a:latin typeface="Times New Roman" panose="02020603050405020304" pitchFamily="18" charset="0"/>
+                <a:cs typeface="Times New Roman" panose="02020603050405020304" pitchFamily="18" charset="0"/>
+              </a:rPr>
+              <a:t>.</a:t>
             </a:r>
             <a:endParaRPr lang="en-US" sz="4800" dirty="0">
               <a:solidFill>
@@ -8844,7 +8874,7 @@
             <a:blip r:embed="rId2">
               <a:extLst>
                 <a:ext uri="{96DAC541-7B7A-43D3-8B79-37D633B846F1}">
-                  <asvg:svgBlip xmlns="" xmlns:asvg="http://schemas.microsoft.com/office/drawing/2016/SVG/main" r:embed="rId4"/>
+                  <asvg:svgBlip xmlns:asvg="http://schemas.microsoft.com/office/drawing/2016/SVG/main" xmlns="" r:embed="rId4"/>
                 </a:ext>
               </a:extLst>
             </a:blip>
@@ -8896,7 +8926,7 @@
             <a:blip r:embed="rId2">
               <a:extLst>
                 <a:ext uri="{96DAC541-7B7A-43D3-8B79-37D633B846F1}">
-                  <asvg:svgBlip xmlns="" xmlns:asvg="http://schemas.microsoft.com/office/drawing/2016/SVG/main" r:embed="rId4"/>
+                  <asvg:svgBlip xmlns:asvg="http://schemas.microsoft.com/office/drawing/2016/SVG/main" xmlns="" r:embed="rId4"/>
                 </a:ext>
               </a:extLst>
             </a:blip>
@@ -9288,7 +9318,7 @@
             <a:blip r:embed="rId2">
               <a:extLst>
                 <a:ext uri="{96DAC541-7B7A-43D3-8B79-37D633B846F1}">
-                  <asvg:svgBlip xmlns="" xmlns:asvg="http://schemas.microsoft.com/office/drawing/2016/SVG/main" r:embed="rId4"/>
+                  <asvg:svgBlip xmlns:asvg="http://schemas.microsoft.com/office/drawing/2016/SVG/main" xmlns="" r:embed="rId4"/>
                 </a:ext>
               </a:extLst>
             </a:blip>
@@ -9340,7 +9370,7 @@
             <a:blip r:embed="rId5">
               <a:extLst>
                 <a:ext uri="{96DAC541-7B7A-43D3-8B79-37D633B846F1}">
-                  <asvg:svgBlip xmlns="" xmlns:asvg="http://schemas.microsoft.com/office/drawing/2016/SVG/main" r:embed="rId6"/>
+                  <asvg:svgBlip xmlns:asvg="http://schemas.microsoft.com/office/drawing/2016/SVG/main" xmlns="" r:embed="rId6"/>
                 </a:ext>
               </a:extLst>
             </a:blip>
@@ -10014,7 +10044,7 @@
   <a:extraClrSchemeLst/>
   <a:extLst>
     <a:ext uri="{05A4C25C-085E-4340-85A3-A5531E510DB2}">
-      <thm15:themeFamily xmlns:thm15="http://schemas.microsoft.com/office/thememl/2012/main" name="Office Theme" id="{62F939B6-93AF-4DB8-9C6B-D6C7DFDC589F}" vid="{4A3C46E8-61CC-4603-A589-7422A47A8E4A}"/>
+      <thm15:themeFamily xmlns:thm15="http://schemas.microsoft.com/office/thememl/2012/main" xmlns="" name="Office Theme" id="{62F939B6-93AF-4DB8-9C6B-D6C7DFDC589F}" vid="{4A3C46E8-61CC-4603-A589-7422A47A8E4A}"/>
     </a:ext>
   </a:extLst>
 </a:theme>

</xml_diff>